<commit_message>
capstone 2 present 2
</commit_message>
<xml_diff>
--- a/Capstone Two/capstone_two_presentation.pptx
+++ b/Capstone Two/capstone_two_presentation.pptx
@@ -121,6 +121,11 @@
       </a:defRPr>
     </a:lvl9pPr>
   </p:defaultTextStyle>
+  <p:extLst>
+    <p:ext uri="{EFAFB233-063F-42B5-8137-9DF3F51BA10A}">
+      <p15:sldGuideLst xmlns:p15="http://schemas.microsoft.com/office/powerpoint/2012/main"/>
+    </p:ext>
+  </p:extLst>
 </p:presentation>
 </file>
 
@@ -4433,7 +4438,7 @@
   <dgm:whole/>
   <dgm:extLst>
     <a:ext uri="http://schemas.microsoft.com/office/drawing/2008/diagram">
-      <dsp:dataModelExt xmlns:dsp="http://schemas.microsoft.com/office/drawing/2008/diagram" relId="rId6" minVer="http://schemas.openxmlformats.org/drawingml/2006/diagram"/>
+      <dsp:dataModelExt xmlns:dsp="http://schemas.microsoft.com/office/drawing/2008/diagram" relId="rId7" minVer="http://schemas.openxmlformats.org/drawingml/2006/diagram"/>
     </a:ext>
   </dgm:extLst>
 </dgm:dataModel>
@@ -4955,7 +4960,7 @@
   <dgm:whole/>
   <dgm:extLst>
     <a:ext uri="http://schemas.microsoft.com/office/drawing/2008/diagram">
-      <dsp:dataModelExt xmlns:dsp="http://schemas.microsoft.com/office/drawing/2008/diagram" relId="rId6" minVer="http://schemas.openxmlformats.org/drawingml/2006/diagram"/>
+      <dsp:dataModelExt xmlns:dsp="http://schemas.microsoft.com/office/drawing/2008/diagram" relId="rId7" minVer="http://schemas.openxmlformats.org/drawingml/2006/diagram"/>
     </a:ext>
   </dgm:extLst>
 </dgm:dataModel>
@@ -5004,8 +5009,8 @@
         </a:p>
       </dgm:t>
     </dgm:pt>
-    <mc:AlternateContent xmlns:mc="http://schemas.openxmlformats.org/markup-compatibility/2006">
-      <mc:Choice xmlns:a14="http://schemas.microsoft.com/office/drawing/2010/main" Requires="a14">
+    <mc:AlternateContent xmlns:mc="http://schemas.openxmlformats.org/markup-compatibility/2006" xmlns:a14="http://schemas.microsoft.com/office/drawing/2010/main">
+      <mc:Choice Requires="a14">
         <dgm:pt modelId="{F6E50952-5605-4418-9DC5-B6A8C4B423EF}">
           <dgm:prSet/>
           <dgm:spPr/>
@@ -5031,7 +5036,7 @@
           </dgm:t>
         </dgm:pt>
       </mc:Choice>
-      <mc:Fallback>
+      <mc:Fallback xmlns="">
         <dgm:pt modelId="{F6E50952-5605-4418-9DC5-B6A8C4B423EF}">
           <dgm:prSet/>
           <dgm:spPr/>
@@ -14927,7 +14932,7 @@
           <a:p>
             <a:fld id="{B7C1CACB-C1BF-47CD-A803-AD98514CAB5D}" type="datetimeFigureOut">
               <a:rPr lang="en-US" smtClean="0"/>
-              <a:t>5/6/2024</a:t>
+              <a:t>5/7/2024</a:t>
             </a:fld>
             <a:endParaRPr lang="en-US"/>
           </a:p>
@@ -15239,8 +15244,12 @@
           <a:lstStyle/>
           <a:p>
             <a:r>
+              <a:rPr lang="en-US"/>
+              <a:t>Thank you </a:t>
+            </a:r>
+            <a:r>
               <a:rPr lang="en-US" dirty="0"/>
-              <a:t>Although the training loss showed a steady decline, the testing loss stayed consistent. Adding different layers to make a deeper network is one way of making the loss match between the training and testing sets. An experiment was tried with a more complicated LSTM consisting of a convolution layer and drop out layers, but the training loss became worse while holding the testing loss at similar levels. This points to the lack of deeper features that the model can learn from and a preference for the initial simpler model.</a:t>
+              <a:t>for coming to my talk on presenting my Springboard capstone project: predicting air quality due to wildfire smoke.</a:t>
             </a:r>
           </a:p>
         </p:txBody>
@@ -15262,7 +15271,7 @@
           <a:p>
             <a:fld id="{564C435E-4484-4C71-A7F3-75B177575741}" type="slidenum">
               <a:rPr lang="en-US" smtClean="0"/>
-              <a:t>12</a:t>
+              <a:t>1</a:t>
             </a:fld>
             <a:endParaRPr lang="en-US"/>
           </a:p>
@@ -15271,7 +15280,7 @@
     </p:spTree>
     <p:extLst>
       <p:ext uri="{BB962C8B-B14F-4D97-AF65-F5344CB8AC3E}">
-        <p14:creationId xmlns:p14="http://schemas.microsoft.com/office/powerpoint/2010/main" val="968766258"/>
+        <p14:creationId xmlns:p14="http://schemas.microsoft.com/office/powerpoint/2010/main" val="196154589"/>
       </p:ext>
     </p:extLst>
   </p:cSld>
@@ -15281,7 +15290,7 @@
 </p:notes>
 </file>
 
-<file path=ppt/notesSlides/notesSlide2.xml><?xml version="1.0" encoding="utf-8"?>
+<file path=ppt/notesSlides/notesSlide10.xml><?xml version="1.0" encoding="utf-8"?>
 <p:notes xmlns:a="http://schemas.openxmlformats.org/drawingml/2006/main" xmlns:r="http://schemas.openxmlformats.org/officeDocument/2006/relationships" xmlns:p="http://schemas.openxmlformats.org/presentationml/2006/main">
   <p:cSld>
     <p:spTree>
@@ -15325,10 +15334,42 @@
           <a:bodyPr/>
           <a:lstStyle/>
           <a:p>
+            <a:pPr marL="0" marR="0" lvl="0" indent="0" algn="l" defTabSz="914400" rtl="0" eaLnBrk="1" fontAlgn="auto" latinLnBrk="0" hangingPunct="1">
+              <a:lnSpc>
+                <a:spcPct val="100000"/>
+              </a:lnSpc>
+              <a:spcBef>
+                <a:spcPts val="0"/>
+              </a:spcBef>
+              <a:spcAft>
+                <a:spcPts val="0"/>
+              </a:spcAft>
+              <a:buClrTx/>
+              <a:buSzTx/>
+              <a:buFontTx/>
+              <a:buNone/>
+              <a:tabLst/>
+              <a:defRPr/>
+            </a:pPr>
             <a:r>
-              <a:rPr lang="en-US" dirty="0"/>
-              <a:t>RMSE is the root mean squared error. Recall we want this metric to be as small as possible.</a:t>
+              <a:rPr lang="en-US" sz="1800" kern="100" dirty="0">
+                <a:effectLst/>
+                <a:latin typeface="Aptos" panose="020B0004020202020204" pitchFamily="34" charset="0"/>
+                <a:ea typeface="Aptos" panose="020B0004020202020204" pitchFamily="34" charset="0"/>
+                <a:cs typeface="Times New Roman" panose="02020603050405020304" pitchFamily="18" charset="0"/>
+              </a:rPr>
+              <a:t>Although the relationship between the features and the label are non-linear, more can be done to predict for non-outliers.  For instance, the spike in PM 2.5 previous can be taken out and more time series analysis can be applied to find more seasonality in air quality</a:t>
             </a:r>
+            <a:r>
+              <a:rPr lang="en-US" sz="1800" kern="100">
+                <a:effectLst/>
+                <a:latin typeface="Aptos" panose="020B0004020202020204" pitchFamily="34" charset="0"/>
+                <a:ea typeface="Aptos" panose="020B0004020202020204" pitchFamily="34" charset="0"/>
+                <a:cs typeface="Times New Roman" panose="02020603050405020304" pitchFamily="18" charset="0"/>
+              </a:rPr>
+              <a:t>. </a:t>
+            </a:r>
+            <a:endParaRPr lang="en-US" dirty="0"/>
           </a:p>
         </p:txBody>
       </p:sp>
@@ -15349,7 +15390,7 @@
           <a:p>
             <a:fld id="{564C435E-4484-4C71-A7F3-75B177575741}" type="slidenum">
               <a:rPr lang="en-US" smtClean="0"/>
-              <a:t>13</a:t>
+              <a:t>15</a:t>
             </a:fld>
             <a:endParaRPr lang="en-US"/>
           </a:p>
@@ -15358,7 +15399,7 @@
     </p:spTree>
     <p:extLst>
       <p:ext uri="{BB962C8B-B14F-4D97-AF65-F5344CB8AC3E}">
-        <p14:creationId xmlns:p14="http://schemas.microsoft.com/office/powerpoint/2010/main" val="661204757"/>
+        <p14:creationId xmlns:p14="http://schemas.microsoft.com/office/powerpoint/2010/main" val="3107428811"/>
       </p:ext>
     </p:extLst>
   </p:cSld>
@@ -15368,7 +15409,7 @@
 </p:notes>
 </file>
 
-<file path=ppt/notesSlides/notesSlide3.xml><?xml version="1.0" encoding="utf-8"?>
+<file path=ppt/notesSlides/notesSlide2.xml><?xml version="1.0" encoding="utf-8"?>
 <p:notes xmlns:a="http://schemas.openxmlformats.org/drawingml/2006/main" xmlns:r="http://schemas.openxmlformats.org/officeDocument/2006/relationships" xmlns:p="http://schemas.openxmlformats.org/presentationml/2006/main">
   <p:cSld>
     <p:spTree>
@@ -15433,7 +15474,7 @@
           <a:p>
             <a:fld id="{564C435E-4484-4C71-A7F3-75B177575741}" type="slidenum">
               <a:rPr lang="en-US" smtClean="0"/>
-              <a:t>15</a:t>
+              <a:t>2</a:t>
             </a:fld>
             <a:endParaRPr lang="en-US"/>
           </a:p>
@@ -15442,7 +15483,1010 @@
     </p:spTree>
     <p:extLst>
       <p:ext uri="{BB962C8B-B14F-4D97-AF65-F5344CB8AC3E}">
-        <p14:creationId xmlns:p14="http://schemas.microsoft.com/office/powerpoint/2010/main" val="3107428811"/>
+        <p14:creationId xmlns:p14="http://schemas.microsoft.com/office/powerpoint/2010/main" val="3352726986"/>
+      </p:ext>
+    </p:extLst>
+  </p:cSld>
+  <p:clrMapOvr>
+    <a:masterClrMapping/>
+  </p:clrMapOvr>
+</p:notes>
+</file>
+
+<file path=ppt/notesSlides/notesSlide3.xml><?xml version="1.0" encoding="utf-8"?>
+<p:notes xmlns:a="http://schemas.openxmlformats.org/drawingml/2006/main" xmlns:r="http://schemas.openxmlformats.org/officeDocument/2006/relationships" xmlns:p="http://schemas.openxmlformats.org/presentationml/2006/main">
+  <p:cSld>
+    <p:spTree>
+      <p:nvGrpSpPr>
+        <p:cNvPr id="1" name=""/>
+        <p:cNvGrpSpPr/>
+        <p:nvPr/>
+      </p:nvGrpSpPr>
+      <p:grpSpPr>
+        <a:xfrm>
+          <a:off x="0" y="0"/>
+          <a:ext cx="0" cy="0"/>
+          <a:chOff x="0" y="0"/>
+          <a:chExt cx="0" cy="0"/>
+        </a:xfrm>
+      </p:grpSpPr>
+      <p:sp>
+        <p:nvSpPr>
+          <p:cNvPr id="2" name="Slide Image Placeholder 1"/>
+          <p:cNvSpPr>
+            <a:spLocks noGrp="1" noRot="1" noChangeAspect="1"/>
+          </p:cNvSpPr>
+          <p:nvPr>
+            <p:ph type="sldImg"/>
+          </p:nvPr>
+        </p:nvSpPr>
+        <p:spPr/>
+      </p:sp>
+      <p:sp>
+        <p:nvSpPr>
+          <p:cNvPr id="3" name="Notes Placeholder 2"/>
+          <p:cNvSpPr>
+            <a:spLocks noGrp="1"/>
+          </p:cNvSpPr>
+          <p:nvPr>
+            <p:ph type="body" idx="1"/>
+          </p:nvPr>
+        </p:nvSpPr>
+        <p:spPr/>
+        <p:txBody>
+          <a:bodyPr/>
+          <a:lstStyle/>
+          <a:p>
+            <a:r>
+              <a:rPr lang="en-US" dirty="0"/>
+              <a:t>The two datasets we will be looking at come from ASOS and the CDC. The main </a:t>
+            </a:r>
+            <a:r>
+              <a:rPr lang="en-US" dirty="0" err="1"/>
+              <a:t>dataframe</a:t>
+            </a:r>
+            <a:r>
+              <a:rPr lang="en-US" dirty="0"/>
+              <a:t> used for modeling combines hourly temp, humidity, wind direction, wind speed with daily mean pm2.5 concentration along the keys of longitude and latitude pairs. First, I did some cleaning of null data in ASOS as a small percentage of data was missing. Then I zipped the pair of long and </a:t>
+            </a:r>
+            <a:r>
+              <a:rPr lang="en-US" dirty="0" err="1"/>
+              <a:t>lat</a:t>
+            </a:r>
+            <a:r>
+              <a:rPr lang="en-US" dirty="0"/>
+              <a:t> and used the python library </a:t>
+            </a:r>
+            <a:r>
+              <a:rPr lang="en-US" dirty="0" err="1"/>
+              <a:t>GeoPandas</a:t>
+            </a:r>
+            <a:r>
+              <a:rPr lang="en-US" dirty="0"/>
+              <a:t> to find the closest matching air quality station to each weather station for the day.</a:t>
+            </a:r>
+          </a:p>
+        </p:txBody>
+      </p:sp>
+      <p:sp>
+        <p:nvSpPr>
+          <p:cNvPr id="4" name="Slide Number Placeholder 3"/>
+          <p:cNvSpPr>
+            <a:spLocks noGrp="1"/>
+          </p:cNvSpPr>
+          <p:nvPr>
+            <p:ph type="sldNum" sz="quarter" idx="5"/>
+          </p:nvPr>
+        </p:nvSpPr>
+        <p:spPr/>
+        <p:txBody>
+          <a:bodyPr/>
+          <a:lstStyle/>
+          <a:p>
+            <a:fld id="{564C435E-4484-4C71-A7F3-75B177575741}" type="slidenum">
+              <a:rPr lang="en-US" smtClean="0"/>
+              <a:t>4</a:t>
+            </a:fld>
+            <a:endParaRPr lang="en-US"/>
+          </a:p>
+        </p:txBody>
+      </p:sp>
+    </p:spTree>
+    <p:extLst>
+      <p:ext uri="{BB962C8B-B14F-4D97-AF65-F5344CB8AC3E}">
+        <p14:creationId xmlns:p14="http://schemas.microsoft.com/office/powerpoint/2010/main" val="1339942425"/>
+      </p:ext>
+    </p:extLst>
+  </p:cSld>
+  <p:clrMapOvr>
+    <a:masterClrMapping/>
+  </p:clrMapOvr>
+</p:notes>
+</file>
+
+<file path=ppt/notesSlides/notesSlide4.xml><?xml version="1.0" encoding="utf-8"?>
+<p:notes xmlns:a="http://schemas.openxmlformats.org/drawingml/2006/main" xmlns:r="http://schemas.openxmlformats.org/officeDocument/2006/relationships" xmlns:p="http://schemas.openxmlformats.org/presentationml/2006/main">
+  <p:cSld>
+    <p:spTree>
+      <p:nvGrpSpPr>
+        <p:cNvPr id="1" name=""/>
+        <p:cNvGrpSpPr/>
+        <p:nvPr/>
+      </p:nvGrpSpPr>
+      <p:grpSpPr>
+        <a:xfrm>
+          <a:off x="0" y="0"/>
+          <a:ext cx="0" cy="0"/>
+          <a:chOff x="0" y="0"/>
+          <a:chExt cx="0" cy="0"/>
+        </a:xfrm>
+      </p:grpSpPr>
+      <p:sp>
+        <p:nvSpPr>
+          <p:cNvPr id="2" name="Slide Image Placeholder 1"/>
+          <p:cNvSpPr>
+            <a:spLocks noGrp="1" noRot="1" noChangeAspect="1"/>
+          </p:cNvSpPr>
+          <p:nvPr>
+            <p:ph type="sldImg"/>
+          </p:nvPr>
+        </p:nvSpPr>
+        <p:spPr/>
+      </p:sp>
+      <p:sp>
+        <p:nvSpPr>
+          <p:cNvPr id="3" name="Notes Placeholder 2"/>
+          <p:cNvSpPr>
+            <a:spLocks noGrp="1"/>
+          </p:cNvSpPr>
+          <p:nvPr>
+            <p:ph type="body" idx="1"/>
+          </p:nvPr>
+        </p:nvSpPr>
+        <p:spPr/>
+        <p:txBody>
+          <a:bodyPr/>
+          <a:lstStyle/>
+          <a:p>
+            <a:r>
+              <a:rPr lang="en-US" dirty="0"/>
+              <a:t>The following are the 8 features and the target variable of PM2.5.</a:t>
+            </a:r>
+          </a:p>
+        </p:txBody>
+      </p:sp>
+      <p:sp>
+        <p:nvSpPr>
+          <p:cNvPr id="4" name="Slide Number Placeholder 3"/>
+          <p:cNvSpPr>
+            <a:spLocks noGrp="1"/>
+          </p:cNvSpPr>
+          <p:nvPr>
+            <p:ph type="sldNum" sz="quarter" idx="5"/>
+          </p:nvPr>
+        </p:nvSpPr>
+        <p:spPr/>
+        <p:txBody>
+          <a:bodyPr/>
+          <a:lstStyle/>
+          <a:p>
+            <a:fld id="{564C435E-4484-4C71-A7F3-75B177575741}" type="slidenum">
+              <a:rPr lang="en-US" smtClean="0"/>
+              <a:t>5</a:t>
+            </a:fld>
+            <a:endParaRPr lang="en-US"/>
+          </a:p>
+        </p:txBody>
+      </p:sp>
+    </p:spTree>
+    <p:extLst>
+      <p:ext uri="{BB962C8B-B14F-4D97-AF65-F5344CB8AC3E}">
+        <p14:creationId xmlns:p14="http://schemas.microsoft.com/office/powerpoint/2010/main" val="3699472630"/>
+      </p:ext>
+    </p:extLst>
+  </p:cSld>
+  <p:clrMapOvr>
+    <a:masterClrMapping/>
+  </p:clrMapOvr>
+</p:notes>
+</file>
+
+<file path=ppt/notesSlides/notesSlide5.xml><?xml version="1.0" encoding="utf-8"?>
+<p:notes xmlns:a="http://schemas.openxmlformats.org/drawingml/2006/main" xmlns:r="http://schemas.openxmlformats.org/officeDocument/2006/relationships" xmlns:p="http://schemas.openxmlformats.org/presentationml/2006/main">
+  <p:cSld>
+    <p:spTree>
+      <p:nvGrpSpPr>
+        <p:cNvPr id="1" name=""/>
+        <p:cNvGrpSpPr/>
+        <p:nvPr/>
+      </p:nvGrpSpPr>
+      <p:grpSpPr>
+        <a:xfrm>
+          <a:off x="0" y="0"/>
+          <a:ext cx="0" cy="0"/>
+          <a:chOff x="0" y="0"/>
+          <a:chExt cx="0" cy="0"/>
+        </a:xfrm>
+      </p:grpSpPr>
+      <p:sp>
+        <p:nvSpPr>
+          <p:cNvPr id="2" name="Slide Image Placeholder 1"/>
+          <p:cNvSpPr>
+            <a:spLocks noGrp="1" noRot="1" noChangeAspect="1"/>
+          </p:cNvSpPr>
+          <p:nvPr>
+            <p:ph type="sldImg"/>
+          </p:nvPr>
+        </p:nvSpPr>
+        <p:spPr/>
+      </p:sp>
+      <p:sp>
+        <p:nvSpPr>
+          <p:cNvPr id="3" name="Notes Placeholder 2"/>
+          <p:cNvSpPr>
+            <a:spLocks noGrp="1"/>
+          </p:cNvSpPr>
+          <p:nvPr>
+            <p:ph type="body" idx="1"/>
+          </p:nvPr>
+        </p:nvSpPr>
+        <p:spPr/>
+        <p:txBody>
+          <a:bodyPr/>
+          <a:lstStyle/>
+          <a:p>
+            <a:r>
+              <a:rPr lang="en-US" sz="1200" dirty="0">
+                <a:solidFill>
+                  <a:schemeClr val="accent2"/>
+                </a:solidFill>
+              </a:rPr>
+              <a:t>There is higher anticorrelation with wind speed 'sped' and wind direction '</a:t>
+            </a:r>
+            <a:r>
+              <a:rPr lang="en-US" sz="1200" dirty="0" err="1">
+                <a:solidFill>
+                  <a:schemeClr val="accent2"/>
+                </a:solidFill>
+              </a:rPr>
+              <a:t>drct</a:t>
+            </a:r>
+            <a:r>
+              <a:rPr lang="en-US" sz="1200" dirty="0">
+                <a:solidFill>
+                  <a:schemeClr val="accent2"/>
+                </a:solidFill>
+              </a:rPr>
+              <a:t>' than the time of the year in the timestamp 'valid' and relative humidity '</a:t>
+            </a:r>
+            <a:r>
+              <a:rPr lang="en-US" sz="1200" dirty="0" err="1">
+                <a:solidFill>
+                  <a:schemeClr val="accent2"/>
+                </a:solidFill>
+              </a:rPr>
+              <a:t>relh</a:t>
+            </a:r>
+            <a:r>
+              <a:rPr lang="en-US" sz="1200" dirty="0">
+                <a:solidFill>
+                  <a:schemeClr val="accent2"/>
+                </a:solidFill>
+              </a:rPr>
+              <a:t>'. This makes sense as we are not concerned with air quality in general, but the type of particle that is most associated with wildfires which can be blown in. Temperature '</a:t>
+            </a:r>
+            <a:r>
+              <a:rPr lang="en-US" sz="1200" dirty="0" err="1">
+                <a:solidFill>
+                  <a:schemeClr val="accent2"/>
+                </a:solidFill>
+              </a:rPr>
+              <a:t>tmpf</a:t>
+            </a:r>
+            <a:r>
+              <a:rPr lang="en-US" sz="1200" dirty="0">
+                <a:solidFill>
+                  <a:schemeClr val="accent2"/>
+                </a:solidFill>
+              </a:rPr>
+              <a:t>' does not vary in extremes in the Bay Area where San </a:t>
+            </a:r>
+            <a:r>
+              <a:rPr lang="en-US" sz="1200" dirty="0" err="1">
+                <a:solidFill>
+                  <a:schemeClr val="accent2"/>
+                </a:solidFill>
+              </a:rPr>
+              <a:t>Francsico</a:t>
+            </a:r>
+            <a:r>
+              <a:rPr lang="en-US" sz="1200" dirty="0">
+                <a:solidFill>
+                  <a:schemeClr val="accent2"/>
+                </a:solidFill>
+              </a:rPr>
+              <a:t> is, so it makes sense that Summer (measured in 'valid') more than temperature impacts wildfires from further out in California.</a:t>
+            </a:r>
+          </a:p>
+          <a:p>
+            <a:endParaRPr lang="en-US" sz="1200" dirty="0">
+              <a:solidFill>
+                <a:schemeClr val="accent2"/>
+              </a:solidFill>
+            </a:endParaRPr>
+          </a:p>
+          <a:p>
+            <a:r>
+              <a:rPr lang="en-US" sz="1200" dirty="0">
+                <a:solidFill>
+                  <a:schemeClr val="accent2"/>
+                </a:solidFill>
+              </a:rPr>
+              <a:t>• Latitude is more correlated than longitude by a (very) small order of magnitude. Some visual analysis of isolated of stations displayed "</a:t>
+            </a:r>
+            <a:r>
+              <a:rPr lang="en-US" sz="1200" dirty="0" err="1">
+                <a:solidFill>
+                  <a:schemeClr val="accent2"/>
+                </a:solidFill>
+              </a:rPr>
+              <a:t>DS_PM_pred</a:t>
+            </a:r>
+            <a:r>
+              <a:rPr lang="en-US" sz="1200" dirty="0">
+                <a:solidFill>
+                  <a:schemeClr val="accent2"/>
+                </a:solidFill>
+              </a:rPr>
+              <a:t>" as generally similar throughout all of the stations around San </a:t>
+            </a:r>
+            <a:r>
+              <a:rPr lang="en-US" sz="1200" dirty="0" err="1">
+                <a:solidFill>
+                  <a:schemeClr val="accent2"/>
+                </a:solidFill>
+              </a:rPr>
+              <a:t>Francsico</a:t>
+            </a:r>
+            <a:r>
+              <a:rPr lang="en-US" sz="1200" dirty="0">
+                <a:solidFill>
+                  <a:schemeClr val="accent2"/>
+                </a:solidFill>
+              </a:rPr>
+              <a:t>. However, latitude may place the station either in a geographical valley or closer to a wildfire. </a:t>
+            </a:r>
+            <a:r>
+              <a:rPr lang="en-US" sz="1800" dirty="0">
+                <a:effectLst/>
+                <a:latin typeface="Aptos" panose="020B0004020202020204" pitchFamily="34" charset="0"/>
+                <a:ea typeface="Aptos" panose="020B0004020202020204" pitchFamily="34" charset="0"/>
+                <a:cs typeface="Times New Roman" panose="02020603050405020304" pitchFamily="18" charset="0"/>
+              </a:rPr>
+              <a:t>Given the mountains to the East, longitude may play less of a role as the air flow is blocked in those directions.</a:t>
+            </a:r>
+            <a:endParaRPr lang="en-US" dirty="0"/>
+          </a:p>
+        </p:txBody>
+      </p:sp>
+      <p:sp>
+        <p:nvSpPr>
+          <p:cNvPr id="4" name="Slide Number Placeholder 3"/>
+          <p:cNvSpPr>
+            <a:spLocks noGrp="1"/>
+          </p:cNvSpPr>
+          <p:nvPr>
+            <p:ph type="sldNum" sz="quarter" idx="5"/>
+          </p:nvPr>
+        </p:nvSpPr>
+        <p:spPr/>
+        <p:txBody>
+          <a:bodyPr/>
+          <a:lstStyle/>
+          <a:p>
+            <a:fld id="{564C435E-4484-4C71-A7F3-75B177575741}" type="slidenum">
+              <a:rPr lang="en-US" smtClean="0"/>
+              <a:t>6</a:t>
+            </a:fld>
+            <a:endParaRPr lang="en-US"/>
+          </a:p>
+        </p:txBody>
+      </p:sp>
+    </p:spTree>
+    <p:extLst>
+      <p:ext uri="{BB962C8B-B14F-4D97-AF65-F5344CB8AC3E}">
+        <p14:creationId xmlns:p14="http://schemas.microsoft.com/office/powerpoint/2010/main" val="1615572156"/>
+      </p:ext>
+    </p:extLst>
+  </p:cSld>
+  <p:clrMapOvr>
+    <a:masterClrMapping/>
+  </p:clrMapOvr>
+</p:notes>
+</file>
+
+<file path=ppt/notesSlides/notesSlide6.xml><?xml version="1.0" encoding="utf-8"?>
+<p:notes xmlns:a="http://schemas.openxmlformats.org/drawingml/2006/main" xmlns:r="http://schemas.openxmlformats.org/officeDocument/2006/relationships" xmlns:p="http://schemas.openxmlformats.org/presentationml/2006/main">
+  <p:cSld>
+    <p:spTree>
+      <p:nvGrpSpPr>
+        <p:cNvPr id="1" name=""/>
+        <p:cNvGrpSpPr/>
+        <p:nvPr/>
+      </p:nvGrpSpPr>
+      <p:grpSpPr>
+        <a:xfrm>
+          <a:off x="0" y="0"/>
+          <a:ext cx="0" cy="0"/>
+          <a:chOff x="0" y="0"/>
+          <a:chExt cx="0" cy="0"/>
+        </a:xfrm>
+      </p:grpSpPr>
+      <p:sp>
+        <p:nvSpPr>
+          <p:cNvPr id="2" name="Slide Image Placeholder 1"/>
+          <p:cNvSpPr>
+            <a:spLocks noGrp="1" noRot="1" noChangeAspect="1"/>
+          </p:cNvSpPr>
+          <p:nvPr>
+            <p:ph type="sldImg"/>
+          </p:nvPr>
+        </p:nvSpPr>
+        <p:spPr/>
+      </p:sp>
+      <p:sp>
+        <p:nvSpPr>
+          <p:cNvPr id="3" name="Notes Placeholder 2"/>
+          <p:cNvSpPr>
+            <a:spLocks noGrp="1"/>
+          </p:cNvSpPr>
+          <p:nvPr>
+            <p:ph type="body" idx="1"/>
+          </p:nvPr>
+        </p:nvSpPr>
+        <p:spPr/>
+        <p:txBody>
+          <a:bodyPr/>
+          <a:lstStyle/>
+          <a:p>
+            <a:r>
+              <a:rPr lang="en-US" dirty="0"/>
+              <a:t>Each color represents a different cross validation time split. The historical explanation of the spike was the Camp Fire, which happened 160 miles away from SF and was the deadliest in California history.</a:t>
+            </a:r>
+          </a:p>
+        </p:txBody>
+      </p:sp>
+      <p:sp>
+        <p:nvSpPr>
+          <p:cNvPr id="4" name="Slide Number Placeholder 3"/>
+          <p:cNvSpPr>
+            <a:spLocks noGrp="1"/>
+          </p:cNvSpPr>
+          <p:nvPr>
+            <p:ph type="sldNum" sz="quarter" idx="5"/>
+          </p:nvPr>
+        </p:nvSpPr>
+        <p:spPr/>
+        <p:txBody>
+          <a:bodyPr/>
+          <a:lstStyle/>
+          <a:p>
+            <a:fld id="{564C435E-4484-4C71-A7F3-75B177575741}" type="slidenum">
+              <a:rPr lang="en-US" smtClean="0"/>
+              <a:t>7</a:t>
+            </a:fld>
+            <a:endParaRPr lang="en-US"/>
+          </a:p>
+        </p:txBody>
+      </p:sp>
+    </p:spTree>
+    <p:extLst>
+      <p:ext uri="{BB962C8B-B14F-4D97-AF65-F5344CB8AC3E}">
+        <p14:creationId xmlns:p14="http://schemas.microsoft.com/office/powerpoint/2010/main" val="3331616897"/>
+      </p:ext>
+    </p:extLst>
+  </p:cSld>
+  <p:clrMapOvr>
+    <a:masterClrMapping/>
+  </p:clrMapOvr>
+</p:notes>
+</file>
+
+<file path=ppt/notesSlides/notesSlide7.xml><?xml version="1.0" encoding="utf-8"?>
+<p:notes xmlns:a="http://schemas.openxmlformats.org/drawingml/2006/main" xmlns:r="http://schemas.openxmlformats.org/officeDocument/2006/relationships" xmlns:p="http://schemas.openxmlformats.org/presentationml/2006/main">
+  <p:cSld>
+    <p:spTree>
+      <p:nvGrpSpPr>
+        <p:cNvPr id="1" name=""/>
+        <p:cNvGrpSpPr/>
+        <p:nvPr/>
+      </p:nvGrpSpPr>
+      <p:grpSpPr>
+        <a:xfrm>
+          <a:off x="0" y="0"/>
+          <a:ext cx="0" cy="0"/>
+          <a:chOff x="0" y="0"/>
+          <a:chExt cx="0" cy="0"/>
+        </a:xfrm>
+      </p:grpSpPr>
+      <p:sp>
+        <p:nvSpPr>
+          <p:cNvPr id="2" name="Slide Image Placeholder 1"/>
+          <p:cNvSpPr>
+            <a:spLocks noGrp="1" noRot="1" noChangeAspect="1"/>
+          </p:cNvSpPr>
+          <p:nvPr>
+            <p:ph type="sldImg"/>
+          </p:nvPr>
+        </p:nvSpPr>
+        <p:spPr/>
+      </p:sp>
+      <p:sp>
+        <p:nvSpPr>
+          <p:cNvPr id="3" name="Notes Placeholder 2"/>
+          <p:cNvSpPr>
+            <a:spLocks noGrp="1"/>
+          </p:cNvSpPr>
+          <p:nvPr>
+            <p:ph type="body" idx="1"/>
+          </p:nvPr>
+        </p:nvSpPr>
+        <p:spPr/>
+        <p:txBody>
+          <a:bodyPr/>
+          <a:lstStyle/>
+          <a:p>
+            <a:pPr marL="342900" marR="0" lvl="0" indent="-342900">
+              <a:lnSpc>
+                <a:spcPct val="107000"/>
+              </a:lnSpc>
+              <a:spcBef>
+                <a:spcPts val="0"/>
+              </a:spcBef>
+              <a:spcAft>
+                <a:spcPts val="0"/>
+              </a:spcAft>
+              <a:buFont typeface="Symbol" panose="05050102010706020507" pitchFamily="18" charset="2"/>
+              <a:buChar char=""/>
+              <a:tabLst>
+                <a:tab pos="3990975" algn="l"/>
+              </a:tabLst>
+            </a:pPr>
+            <a:r>
+              <a:rPr lang="en-US" sz="1800" kern="100" dirty="0">
+                <a:effectLst/>
+                <a:latin typeface="Aptos" panose="020B0004020202020204" pitchFamily="34" charset="0"/>
+                <a:ea typeface="Aptos" panose="020B0004020202020204" pitchFamily="34" charset="0"/>
+                <a:cs typeface="Times New Roman" panose="02020603050405020304" pitchFamily="18" charset="0"/>
+              </a:rPr>
+              <a:t>'</a:t>
+            </a:r>
+            <a:r>
+              <a:rPr lang="en-US" sz="1800" kern="100" dirty="0" err="1">
+                <a:effectLst/>
+                <a:latin typeface="Aptos" panose="020B0004020202020204" pitchFamily="34" charset="0"/>
+                <a:ea typeface="Aptos" panose="020B0004020202020204" pitchFamily="34" charset="0"/>
+                <a:cs typeface="Times New Roman" panose="02020603050405020304" pitchFamily="18" charset="0"/>
+              </a:rPr>
+              <a:t>DS_PM_pred</a:t>
+            </a:r>
+            <a:r>
+              <a:rPr lang="en-US" sz="1800" kern="100" dirty="0">
+                <a:effectLst/>
+                <a:latin typeface="Aptos" panose="020B0004020202020204" pitchFamily="34" charset="0"/>
+                <a:ea typeface="Aptos" panose="020B0004020202020204" pitchFamily="34" charset="0"/>
+                <a:cs typeface="Times New Roman" panose="02020603050405020304" pitchFamily="18" charset="0"/>
+              </a:rPr>
+              <a:t>': We expect for the most part to be right skewed because of wildfire, while the majority of the data reflects safe air quality levels. </a:t>
+            </a:r>
+          </a:p>
+          <a:p>
+            <a:pPr marL="342900" marR="0" lvl="0" indent="-342900">
+              <a:lnSpc>
+                <a:spcPct val="107000"/>
+              </a:lnSpc>
+              <a:spcBef>
+                <a:spcPts val="0"/>
+              </a:spcBef>
+              <a:spcAft>
+                <a:spcPts val="0"/>
+              </a:spcAft>
+              <a:buFont typeface="Symbol" panose="05050102010706020507" pitchFamily="18" charset="2"/>
+              <a:buChar char=""/>
+              <a:tabLst>
+                <a:tab pos="3990975" algn="l"/>
+              </a:tabLst>
+            </a:pPr>
+            <a:r>
+              <a:rPr lang="en-US" sz="1800" kern="100" dirty="0">
+                <a:effectLst/>
+                <a:latin typeface="Aptos" panose="020B0004020202020204" pitchFamily="34" charset="0"/>
+                <a:ea typeface="Aptos" panose="020B0004020202020204" pitchFamily="34" charset="0"/>
+                <a:cs typeface="Times New Roman" panose="02020603050405020304" pitchFamily="18" charset="0"/>
+              </a:rPr>
+              <a:t>'</a:t>
+            </a:r>
+            <a:r>
+              <a:rPr lang="en-US" sz="1800" kern="100" dirty="0" err="1">
+                <a:effectLst/>
+                <a:latin typeface="Aptos" panose="020B0004020202020204" pitchFamily="34" charset="0"/>
+                <a:ea typeface="Aptos" panose="020B0004020202020204" pitchFamily="34" charset="0"/>
+                <a:cs typeface="Times New Roman" panose="02020603050405020304" pitchFamily="18" charset="0"/>
+              </a:rPr>
+              <a:t>tmpf</a:t>
+            </a:r>
+            <a:r>
+              <a:rPr lang="en-US" sz="1800" kern="100" dirty="0">
+                <a:effectLst/>
+                <a:latin typeface="Aptos" panose="020B0004020202020204" pitchFamily="34" charset="0"/>
+                <a:ea typeface="Aptos" panose="020B0004020202020204" pitchFamily="34" charset="0"/>
+                <a:cs typeface="Times New Roman" panose="02020603050405020304" pitchFamily="18" charset="0"/>
+              </a:rPr>
+              <a:t>': This is almost normal and may just need scaling. </a:t>
+            </a:r>
+          </a:p>
+          <a:p>
+            <a:pPr marL="342900" marR="0" lvl="0" indent="-342900">
+              <a:lnSpc>
+                <a:spcPct val="107000"/>
+              </a:lnSpc>
+              <a:spcBef>
+                <a:spcPts val="0"/>
+              </a:spcBef>
+              <a:spcAft>
+                <a:spcPts val="0"/>
+              </a:spcAft>
+              <a:buFont typeface="Symbol" panose="05050102010706020507" pitchFamily="18" charset="2"/>
+              <a:buChar char=""/>
+              <a:tabLst>
+                <a:tab pos="3990975" algn="l"/>
+              </a:tabLst>
+            </a:pPr>
+            <a:r>
+              <a:rPr lang="en-US" sz="1800" kern="100" dirty="0">
+                <a:effectLst/>
+                <a:latin typeface="Aptos" panose="020B0004020202020204" pitchFamily="34" charset="0"/>
+                <a:ea typeface="Aptos" panose="020B0004020202020204" pitchFamily="34" charset="0"/>
+                <a:cs typeface="Times New Roman" panose="02020603050405020304" pitchFamily="18" charset="0"/>
+              </a:rPr>
+              <a:t>'</a:t>
+            </a:r>
+            <a:r>
+              <a:rPr lang="en-US" sz="1800" kern="100" dirty="0" err="1">
+                <a:effectLst/>
+                <a:latin typeface="Aptos" panose="020B0004020202020204" pitchFamily="34" charset="0"/>
+                <a:ea typeface="Aptos" panose="020B0004020202020204" pitchFamily="34" charset="0"/>
+                <a:cs typeface="Times New Roman" panose="02020603050405020304" pitchFamily="18" charset="0"/>
+              </a:rPr>
+              <a:t>relh</a:t>
+            </a:r>
+            <a:r>
+              <a:rPr lang="en-US" sz="1800" kern="100" dirty="0">
+                <a:effectLst/>
+                <a:latin typeface="Aptos" panose="020B0004020202020204" pitchFamily="34" charset="0"/>
+                <a:ea typeface="Aptos" panose="020B0004020202020204" pitchFamily="34" charset="0"/>
+                <a:cs typeface="Times New Roman" panose="02020603050405020304" pitchFamily="18" charset="0"/>
+              </a:rPr>
+              <a:t>': There is a slight left skew. </a:t>
+            </a:r>
+          </a:p>
+          <a:p>
+            <a:pPr marL="342900" marR="0" lvl="0" indent="-342900">
+              <a:lnSpc>
+                <a:spcPct val="107000"/>
+              </a:lnSpc>
+              <a:spcBef>
+                <a:spcPts val="0"/>
+              </a:spcBef>
+              <a:spcAft>
+                <a:spcPts val="0"/>
+              </a:spcAft>
+              <a:buFont typeface="Symbol" panose="05050102010706020507" pitchFamily="18" charset="2"/>
+              <a:buChar char=""/>
+              <a:tabLst>
+                <a:tab pos="3990975" algn="l"/>
+              </a:tabLst>
+            </a:pPr>
+            <a:r>
+              <a:rPr lang="en-US" sz="1800" kern="100" dirty="0">
+                <a:effectLst/>
+                <a:latin typeface="Aptos" panose="020B0004020202020204" pitchFamily="34" charset="0"/>
+                <a:ea typeface="Aptos" panose="020B0004020202020204" pitchFamily="34" charset="0"/>
+                <a:cs typeface="Times New Roman" panose="02020603050405020304" pitchFamily="18" charset="0"/>
+              </a:rPr>
+              <a:t>'</a:t>
+            </a:r>
+            <a:r>
+              <a:rPr lang="en-US" sz="1800" kern="100" dirty="0" err="1">
+                <a:effectLst/>
+                <a:latin typeface="Aptos" panose="020B0004020202020204" pitchFamily="34" charset="0"/>
+                <a:ea typeface="Aptos" panose="020B0004020202020204" pitchFamily="34" charset="0"/>
+                <a:cs typeface="Times New Roman" panose="02020603050405020304" pitchFamily="18" charset="0"/>
+              </a:rPr>
+              <a:t>drct</a:t>
+            </a:r>
+            <a:r>
+              <a:rPr lang="en-US" sz="1800" kern="100" dirty="0">
+                <a:effectLst/>
+                <a:latin typeface="Aptos" panose="020B0004020202020204" pitchFamily="34" charset="0"/>
+                <a:ea typeface="Aptos" panose="020B0004020202020204" pitchFamily="34" charset="0"/>
+                <a:cs typeface="Times New Roman" panose="02020603050405020304" pitchFamily="18" charset="0"/>
+              </a:rPr>
+              <a:t>': The wind direction may be default 0 when there is no wind speed. Otherwise, as a coastal city, the wind direction remains one way most of the time. </a:t>
+            </a:r>
+          </a:p>
+          <a:p>
+            <a:pPr marL="342900" marR="0" lvl="0" indent="-342900">
+              <a:lnSpc>
+                <a:spcPct val="107000"/>
+              </a:lnSpc>
+              <a:spcBef>
+                <a:spcPts val="0"/>
+              </a:spcBef>
+              <a:spcAft>
+                <a:spcPts val="800"/>
+              </a:spcAft>
+              <a:buFont typeface="Symbol" panose="05050102010706020507" pitchFamily="18" charset="2"/>
+              <a:buChar char=""/>
+              <a:tabLst>
+                <a:tab pos="3990975" algn="l"/>
+              </a:tabLst>
+            </a:pPr>
+            <a:r>
+              <a:rPr lang="en-US" sz="1800" kern="100" dirty="0">
+                <a:effectLst/>
+                <a:latin typeface="Aptos" panose="020B0004020202020204" pitchFamily="34" charset="0"/>
+                <a:ea typeface="Aptos" panose="020B0004020202020204" pitchFamily="34" charset="0"/>
+                <a:cs typeface="Times New Roman" panose="02020603050405020304" pitchFamily="18" charset="0"/>
+              </a:rPr>
+              <a:t>'sped': There is a slight right skew.</a:t>
+            </a:r>
+          </a:p>
+          <a:p>
+            <a:endParaRPr lang="en-US" dirty="0"/>
+          </a:p>
+          <a:p>
+            <a:r>
+              <a:rPr lang="en-US" dirty="0"/>
+              <a:t>I eventually settled on </a:t>
+            </a:r>
+            <a:r>
+              <a:rPr lang="en-US" dirty="0" err="1"/>
+              <a:t>MinMaxScaler</a:t>
+            </a:r>
+            <a:r>
+              <a:rPr lang="en-US" dirty="0"/>
+              <a:t> as that seems most useful for the LSTM model. </a:t>
+            </a:r>
+            <a:r>
+              <a:rPr lang="en-US" dirty="0" err="1"/>
+              <a:t>StandardScaler</a:t>
+            </a:r>
+            <a:r>
+              <a:rPr lang="en-US" dirty="0"/>
+              <a:t> and </a:t>
+            </a:r>
+            <a:r>
+              <a:rPr lang="en-US" dirty="0" err="1"/>
+              <a:t>RobustScaler</a:t>
+            </a:r>
+            <a:r>
+              <a:rPr lang="en-US" dirty="0"/>
+              <a:t> had little to no effect a test on an OLS model.</a:t>
+            </a:r>
+          </a:p>
+        </p:txBody>
+      </p:sp>
+      <p:sp>
+        <p:nvSpPr>
+          <p:cNvPr id="4" name="Slide Number Placeholder 3"/>
+          <p:cNvSpPr>
+            <a:spLocks noGrp="1"/>
+          </p:cNvSpPr>
+          <p:nvPr>
+            <p:ph type="sldNum" sz="quarter" idx="5"/>
+          </p:nvPr>
+        </p:nvSpPr>
+        <p:spPr/>
+        <p:txBody>
+          <a:bodyPr/>
+          <a:lstStyle/>
+          <a:p>
+            <a:fld id="{564C435E-4484-4C71-A7F3-75B177575741}" type="slidenum">
+              <a:rPr lang="en-US" smtClean="0"/>
+              <a:t>8</a:t>
+            </a:fld>
+            <a:endParaRPr lang="en-US"/>
+          </a:p>
+        </p:txBody>
+      </p:sp>
+    </p:spTree>
+    <p:extLst>
+      <p:ext uri="{BB962C8B-B14F-4D97-AF65-F5344CB8AC3E}">
+        <p14:creationId xmlns:p14="http://schemas.microsoft.com/office/powerpoint/2010/main" val="3910227312"/>
+      </p:ext>
+    </p:extLst>
+  </p:cSld>
+  <p:clrMapOvr>
+    <a:masterClrMapping/>
+  </p:clrMapOvr>
+</p:notes>
+</file>
+
+<file path=ppt/notesSlides/notesSlide8.xml><?xml version="1.0" encoding="utf-8"?>
+<p:notes xmlns:a="http://schemas.openxmlformats.org/drawingml/2006/main" xmlns:r="http://schemas.openxmlformats.org/officeDocument/2006/relationships" xmlns:p="http://schemas.openxmlformats.org/presentationml/2006/main">
+  <p:cSld>
+    <p:spTree>
+      <p:nvGrpSpPr>
+        <p:cNvPr id="1" name=""/>
+        <p:cNvGrpSpPr/>
+        <p:nvPr/>
+      </p:nvGrpSpPr>
+      <p:grpSpPr>
+        <a:xfrm>
+          <a:off x="0" y="0"/>
+          <a:ext cx="0" cy="0"/>
+          <a:chOff x="0" y="0"/>
+          <a:chExt cx="0" cy="0"/>
+        </a:xfrm>
+      </p:grpSpPr>
+      <p:sp>
+        <p:nvSpPr>
+          <p:cNvPr id="2" name="Slide Image Placeholder 1"/>
+          <p:cNvSpPr>
+            <a:spLocks noGrp="1" noRot="1" noChangeAspect="1"/>
+          </p:cNvSpPr>
+          <p:nvPr>
+            <p:ph type="sldImg"/>
+          </p:nvPr>
+        </p:nvSpPr>
+        <p:spPr/>
+      </p:sp>
+      <p:sp>
+        <p:nvSpPr>
+          <p:cNvPr id="3" name="Notes Placeholder 2"/>
+          <p:cNvSpPr>
+            <a:spLocks noGrp="1"/>
+          </p:cNvSpPr>
+          <p:nvPr>
+            <p:ph type="body" idx="1"/>
+          </p:nvPr>
+        </p:nvSpPr>
+        <p:spPr/>
+        <p:txBody>
+          <a:bodyPr/>
+          <a:lstStyle/>
+          <a:p>
+            <a:r>
+              <a:rPr lang="en-US" dirty="0"/>
+              <a:t>MAE is mean absolute error.</a:t>
+            </a:r>
+          </a:p>
+          <a:p>
+            <a:endParaRPr lang="en-US" dirty="0"/>
+          </a:p>
+          <a:p>
+            <a:r>
+              <a:rPr lang="en-US" dirty="0"/>
+              <a:t>Although the training loss showed a steady decline, the testing loss stayed consistent. Adding different layers to make a deeper network is one way of making the loss match between the training and testing sets. An experiment was tried with a more complicated LSTM consisting of a convolution layer and drop out layers, but the training loss became worse while holding the testing loss at similar levels. This points to the lack of deeper features that the model can learn from and a preference for the initial simpler model.</a:t>
+            </a:r>
+          </a:p>
+        </p:txBody>
+      </p:sp>
+      <p:sp>
+        <p:nvSpPr>
+          <p:cNvPr id="4" name="Slide Number Placeholder 3"/>
+          <p:cNvSpPr>
+            <a:spLocks noGrp="1"/>
+          </p:cNvSpPr>
+          <p:nvPr>
+            <p:ph type="sldNum" sz="quarter" idx="5"/>
+          </p:nvPr>
+        </p:nvSpPr>
+        <p:spPr/>
+        <p:txBody>
+          <a:bodyPr/>
+          <a:lstStyle/>
+          <a:p>
+            <a:fld id="{564C435E-4484-4C71-A7F3-75B177575741}" type="slidenum">
+              <a:rPr lang="en-US" smtClean="0"/>
+              <a:t>12</a:t>
+            </a:fld>
+            <a:endParaRPr lang="en-US"/>
+          </a:p>
+        </p:txBody>
+      </p:sp>
+    </p:spTree>
+    <p:extLst>
+      <p:ext uri="{BB962C8B-B14F-4D97-AF65-F5344CB8AC3E}">
+        <p14:creationId xmlns:p14="http://schemas.microsoft.com/office/powerpoint/2010/main" val="968766258"/>
+      </p:ext>
+    </p:extLst>
+  </p:cSld>
+  <p:clrMapOvr>
+    <a:masterClrMapping/>
+  </p:clrMapOvr>
+</p:notes>
+</file>
+
+<file path=ppt/notesSlides/notesSlide9.xml><?xml version="1.0" encoding="utf-8"?>
+<p:notes xmlns:a="http://schemas.openxmlformats.org/drawingml/2006/main" xmlns:r="http://schemas.openxmlformats.org/officeDocument/2006/relationships" xmlns:p="http://schemas.openxmlformats.org/presentationml/2006/main">
+  <p:cSld>
+    <p:spTree>
+      <p:nvGrpSpPr>
+        <p:cNvPr id="1" name=""/>
+        <p:cNvGrpSpPr/>
+        <p:nvPr/>
+      </p:nvGrpSpPr>
+      <p:grpSpPr>
+        <a:xfrm>
+          <a:off x="0" y="0"/>
+          <a:ext cx="0" cy="0"/>
+          <a:chOff x="0" y="0"/>
+          <a:chExt cx="0" cy="0"/>
+        </a:xfrm>
+      </p:grpSpPr>
+      <p:sp>
+        <p:nvSpPr>
+          <p:cNvPr id="2" name="Slide Image Placeholder 1"/>
+          <p:cNvSpPr>
+            <a:spLocks noGrp="1" noRot="1" noChangeAspect="1"/>
+          </p:cNvSpPr>
+          <p:nvPr>
+            <p:ph type="sldImg"/>
+          </p:nvPr>
+        </p:nvSpPr>
+        <p:spPr/>
+      </p:sp>
+      <p:sp>
+        <p:nvSpPr>
+          <p:cNvPr id="3" name="Notes Placeholder 2"/>
+          <p:cNvSpPr>
+            <a:spLocks noGrp="1"/>
+          </p:cNvSpPr>
+          <p:nvPr>
+            <p:ph type="body" idx="1"/>
+          </p:nvPr>
+        </p:nvSpPr>
+        <p:spPr/>
+        <p:txBody>
+          <a:bodyPr/>
+          <a:lstStyle/>
+          <a:p>
+            <a:r>
+              <a:rPr lang="en-US" dirty="0"/>
+              <a:t>RMSE is the root mean squared error. Recall we want this metric to be as small as possible. There is no upper bound for this metric.</a:t>
+            </a:r>
+          </a:p>
+        </p:txBody>
+      </p:sp>
+      <p:sp>
+        <p:nvSpPr>
+          <p:cNvPr id="4" name="Slide Number Placeholder 3"/>
+          <p:cNvSpPr>
+            <a:spLocks noGrp="1"/>
+          </p:cNvSpPr>
+          <p:nvPr>
+            <p:ph type="sldNum" sz="quarter" idx="5"/>
+          </p:nvPr>
+        </p:nvSpPr>
+        <p:spPr/>
+        <p:txBody>
+          <a:bodyPr/>
+          <a:lstStyle/>
+          <a:p>
+            <a:fld id="{564C435E-4484-4C71-A7F3-75B177575741}" type="slidenum">
+              <a:rPr lang="en-US" smtClean="0"/>
+              <a:t>13</a:t>
+            </a:fld>
+            <a:endParaRPr lang="en-US"/>
+          </a:p>
+        </p:txBody>
+      </p:sp>
+    </p:spTree>
+    <p:extLst>
+      <p:ext uri="{BB962C8B-B14F-4D97-AF65-F5344CB8AC3E}">
+        <p14:creationId xmlns:p14="http://schemas.microsoft.com/office/powerpoint/2010/main" val="661204757"/>
       </p:ext>
     </p:extLst>
   </p:cSld>
@@ -15583,7 +16627,7 @@
           <a:p>
             <a:fld id="{1859E9A3-7164-43F0-B4EE-63C8ED1F9E6B}" type="datetimeFigureOut">
               <a:rPr lang="en-US" smtClean="0"/>
-              <a:t>5/5/2024</a:t>
+              <a:t>5/7/2024</a:t>
             </a:fld>
             <a:endParaRPr lang="en-US"/>
           </a:p>
@@ -15753,7 +16797,7 @@
           <a:p>
             <a:fld id="{1859E9A3-7164-43F0-B4EE-63C8ED1F9E6B}" type="datetimeFigureOut">
               <a:rPr lang="en-US" smtClean="0"/>
-              <a:t>5/5/2024</a:t>
+              <a:t>5/7/2024</a:t>
             </a:fld>
             <a:endParaRPr lang="en-US"/>
           </a:p>
@@ -15933,7 +16977,7 @@
           <a:p>
             <a:fld id="{1859E9A3-7164-43F0-B4EE-63C8ED1F9E6B}" type="datetimeFigureOut">
               <a:rPr lang="en-US" smtClean="0"/>
-              <a:t>5/5/2024</a:t>
+              <a:t>5/7/2024</a:t>
             </a:fld>
             <a:endParaRPr lang="en-US"/>
           </a:p>
@@ -16103,7 +17147,7 @@
           <a:p>
             <a:fld id="{1859E9A3-7164-43F0-B4EE-63C8ED1F9E6B}" type="datetimeFigureOut">
               <a:rPr lang="en-US" smtClean="0"/>
-              <a:t>5/5/2024</a:t>
+              <a:t>5/7/2024</a:t>
             </a:fld>
             <a:endParaRPr lang="en-US"/>
           </a:p>
@@ -16349,7 +17393,7 @@
           <a:p>
             <a:fld id="{1859E9A3-7164-43F0-B4EE-63C8ED1F9E6B}" type="datetimeFigureOut">
               <a:rPr lang="en-US" smtClean="0"/>
-              <a:t>5/5/2024</a:t>
+              <a:t>5/7/2024</a:t>
             </a:fld>
             <a:endParaRPr lang="en-US"/>
           </a:p>
@@ -16581,7 +17625,7 @@
           <a:p>
             <a:fld id="{1859E9A3-7164-43F0-B4EE-63C8ED1F9E6B}" type="datetimeFigureOut">
               <a:rPr lang="en-US" smtClean="0"/>
-              <a:t>5/5/2024</a:t>
+              <a:t>5/7/2024</a:t>
             </a:fld>
             <a:endParaRPr lang="en-US"/>
           </a:p>
@@ -16948,7 +17992,7 @@
           <a:p>
             <a:fld id="{1859E9A3-7164-43F0-B4EE-63C8ED1F9E6B}" type="datetimeFigureOut">
               <a:rPr lang="en-US" smtClean="0"/>
-              <a:t>5/5/2024</a:t>
+              <a:t>5/7/2024</a:t>
             </a:fld>
             <a:endParaRPr lang="en-US"/>
           </a:p>
@@ -17066,7 +18110,7 @@
           <a:p>
             <a:fld id="{1859E9A3-7164-43F0-B4EE-63C8ED1F9E6B}" type="datetimeFigureOut">
               <a:rPr lang="en-US" smtClean="0"/>
-              <a:t>5/5/2024</a:t>
+              <a:t>5/7/2024</a:t>
             </a:fld>
             <a:endParaRPr lang="en-US"/>
           </a:p>
@@ -17161,7 +18205,7 @@
           <a:p>
             <a:fld id="{1859E9A3-7164-43F0-B4EE-63C8ED1F9E6B}" type="datetimeFigureOut">
               <a:rPr lang="en-US" smtClean="0"/>
-              <a:t>5/5/2024</a:t>
+              <a:t>5/7/2024</a:t>
             </a:fld>
             <a:endParaRPr lang="en-US"/>
           </a:p>
@@ -17438,7 +18482,7 @@
           <a:p>
             <a:fld id="{1859E9A3-7164-43F0-B4EE-63C8ED1F9E6B}" type="datetimeFigureOut">
               <a:rPr lang="en-US" smtClean="0"/>
-              <a:t>5/5/2024</a:t>
+              <a:t>5/7/2024</a:t>
             </a:fld>
             <a:endParaRPr lang="en-US"/>
           </a:p>
@@ -17695,7 +18739,7 @@
           <a:p>
             <a:fld id="{1859E9A3-7164-43F0-B4EE-63C8ED1F9E6B}" type="datetimeFigureOut">
               <a:rPr lang="en-US" smtClean="0"/>
-              <a:t>5/5/2024</a:t>
+              <a:t>5/7/2024</a:t>
             </a:fld>
             <a:endParaRPr lang="en-US"/>
           </a:p>
@@ -17908,7 +18952,7 @@
           <a:p>
             <a:fld id="{1859E9A3-7164-43F0-B4EE-63C8ED1F9E6B}" type="datetimeFigureOut">
               <a:rPr lang="en-US" smtClean="0"/>
-              <a:t>5/5/2024</a:t>
+              <a:t>5/7/2024</a:t>
             </a:fld>
             <a:endParaRPr lang="en-US"/>
           </a:p>
@@ -18539,13 +19583,13 @@
           <p:nvPr/>
         </p:nvPicPr>
         <p:blipFill>
-          <a:blip r:embed="rId2">
+          <a:blip r:embed="rId3">
             <a:extLst>
               <a:ext uri="{28A0092B-C50C-407E-A947-70E740481C1C}">
                 <a14:useLocalDpi xmlns:a14="http://schemas.microsoft.com/office/drawing/2010/main" val="0"/>
               </a:ext>
               <a:ext uri="{96DAC541-7B7A-43D3-8B79-37D633B846F1}">
-                <asvg:svgBlip xmlns:asvg="http://schemas.microsoft.com/office/drawing/2016/SVG/main" r:embed="rId3"/>
+                <asvg:svgBlip xmlns:asvg="http://schemas.microsoft.com/office/drawing/2016/SVG/main" r:embed="rId4"/>
               </a:ext>
             </a:extLst>
           </a:blip>
@@ -20705,8 +21749,8 @@
           </a:p>
         </p:txBody>
       </p:sp>
-      <mc:AlternateContent xmlns:mc="http://schemas.openxmlformats.org/markup-compatibility/2006">
-        <mc:Choice xmlns:a14="http://schemas.microsoft.com/office/drawing/2010/main" Requires="a14">
+      <mc:AlternateContent xmlns:mc="http://schemas.openxmlformats.org/markup-compatibility/2006" xmlns:a14="http://schemas.microsoft.com/office/drawing/2010/main">
+        <mc:Choice Requires="a14">
           <p:graphicFrame>
             <p:nvGraphicFramePr>
               <p:cNvPr id="4" name="Content Placeholder 3">
@@ -20739,7 +21783,7 @@
             </a:graphic>
           </p:graphicFrame>
         </mc:Choice>
-        <mc:Fallback>
+        <mc:Fallback xmlns="">
           <p:graphicFrame>
             <p:nvGraphicFramePr>
               <p:cNvPr id="4" name="Content Placeholder 3">
@@ -20767,7 +21811,7 @@
             </p:xfrm>
             <a:graphic>
               <a:graphicData uri="http://schemas.openxmlformats.org/drawingml/2006/diagram">
-                <dgm:relIds xmlns:dgm="http://schemas.openxmlformats.org/drawingml/2006/diagram" xmlns:r="http://schemas.openxmlformats.org/officeDocument/2006/relationships" r:dm="rId7" r:lo="rId3" r:qs="rId4" r:cs="rId5"/>
+                <dgm:relIds xmlns:dgm="http://schemas.openxmlformats.org/drawingml/2006/diagram" xmlns:r="http://schemas.openxmlformats.org/officeDocument/2006/relationships" r:dm="rId7" r:lo="rId8" r:qs="rId9" r:cs="rId10"/>
               </a:graphicData>
             </a:graphic>
           </p:graphicFrame>
@@ -22616,7 +23660,7 @@
                 </a:ln>
                 <a:effectLst/>
                 <a:latin typeface="Arial" panose="020B0604020202020204" pitchFamily="34" charset="0"/>
-                <a:hlinkClick r:id="rId2"/>
+                <a:hlinkClick r:id="rId3"/>
               </a:rPr>
               <a:t>WHO</a:t>
             </a:r>
@@ -22661,26 +23705,14 @@
               <a:tabLst/>
             </a:pPr>
             <a:r>
-              <a:rPr lang="en-US" altLang="en-US" sz="2400" dirty="0">
+              <a:rPr lang="en-US" altLang="en-US" sz="2400">
                 <a:solidFill>
                   <a:schemeClr val="accent6"/>
                 </a:solidFill>
                 <a:latin typeface="Arial" panose="020B0604020202020204" pitchFamily="34" charset="0"/>
               </a:rPr>
-              <a:t>Can we predict how long the air will be dangerous for after wildfires?</a:t>
+              <a:t>Can we predict for how long after wildfires the air will remain dangerous?</a:t>
             </a:r>
-            <a:endParaRPr kumimoji="0" lang="en-US" altLang="en-US" sz="2400" b="0" i="0" u="none" strike="noStrike" cap="none" normalizeH="0" baseline="0" dirty="0">
-              <a:ln>
-                <a:noFill/>
-              </a:ln>
-              <a:solidFill>
-                <a:schemeClr val="accent6"/>
-              </a:solidFill>
-              <a:effectLst/>
-              <a:latin typeface="Arial" panose="020B0604020202020204" pitchFamily="34" charset="0"/>
-            </a:endParaRPr>
-          </a:p>
-          <a:p>
             <a:endParaRPr lang="en-US" sz="2400" dirty="0"/>
           </a:p>
         </p:txBody>
@@ -23364,7 +24396,7 @@
         </p:xfrm>
         <a:graphic>
           <a:graphicData uri="http://schemas.openxmlformats.org/drawingml/2006/diagram">
-            <dgm:relIds xmlns:dgm="http://schemas.openxmlformats.org/drawingml/2006/diagram" xmlns:r="http://schemas.openxmlformats.org/officeDocument/2006/relationships" r:dm="rId2" r:lo="rId3" r:qs="rId4" r:cs="rId5"/>
+            <dgm:relIds xmlns:dgm="http://schemas.openxmlformats.org/drawingml/2006/diagram" xmlns:r="http://schemas.openxmlformats.org/officeDocument/2006/relationships" r:dm="rId3" r:lo="rId4" r:qs="rId5" r:cs="rId6"/>
           </a:graphicData>
         </a:graphic>
       </p:graphicFrame>
@@ -23549,7 +24581,7 @@
         </p:xfrm>
         <a:graphic>
           <a:graphicData uri="http://schemas.openxmlformats.org/drawingml/2006/diagram">
-            <dgm:relIds xmlns:dgm="http://schemas.openxmlformats.org/drawingml/2006/diagram" xmlns:r="http://schemas.openxmlformats.org/officeDocument/2006/relationships" r:dm="rId2" r:lo="rId3" r:qs="rId4" r:cs="rId5"/>
+            <dgm:relIds xmlns:dgm="http://schemas.openxmlformats.org/drawingml/2006/diagram" xmlns:r="http://schemas.openxmlformats.org/officeDocument/2006/relationships" r:dm="rId3" r:lo="rId4" r:qs="rId5" r:cs="rId6"/>
           </a:graphicData>
         </a:graphic>
       </p:graphicFrame>
@@ -23944,7 +24976,7 @@
                   <a:schemeClr val="accent2"/>
                 </a:solidFill>
               </a:rPr>
-              <a:t>We look at a heat map of the correlation table of features</a:t>
+              <a:t>We look at a heat map of the correlation table of numerical features</a:t>
             </a:r>
           </a:p>
           <a:p>
@@ -24201,7 +25233,7 @@
           <p:nvPr/>
         </p:nvPicPr>
         <p:blipFill rotWithShape="1">
-          <a:blip r:embed="rId2"/>
+          <a:blip r:embed="rId3"/>
           <a:srcRect t="4611" b="9598"/>
           <a:stretch/>
         </p:blipFill>
@@ -24951,7 +25983,7 @@
           <p:nvPr/>
         </p:nvPicPr>
         <p:blipFill>
-          <a:blip r:embed="rId2"/>
+          <a:blip r:embed="rId3"/>
           <a:stretch>
             <a:fillRect/>
           </a:stretch>
@@ -25190,7 +26222,7 @@
           <p:nvPr/>
         </p:nvPicPr>
         <p:blipFill rotWithShape="1">
-          <a:blip r:embed="rId2"/>
+          <a:blip r:embed="rId3"/>
           <a:srcRect r="975" b="-3"/>
           <a:stretch/>
         </p:blipFill>

</xml_diff>